<commit_message>
truly last changes this time
</commit_message>
<xml_diff>
--- a/dry/mightedit.pptx
+++ b/dry/mightedit.pptx
@@ -557,7 +557,17 @@
   <c:chart>
     <c:autoTitleDeleted val="1"/>
     <c:plotArea>
-      <c:layout/>
+      <c:layout>
+        <c:manualLayout>
+          <c:layoutTarget val="inner"/>
+          <c:xMode val="edge"/>
+          <c:yMode val="edge"/>
+          <c:x val="3.0091166338582678E-2"/>
+          <c:y val="1.7121184970399547E-2"/>
+          <c:w val="0.94017052165354331"/>
+          <c:h val="0.90587094575104909"/>
+        </c:manualLayout>
+      </c:layout>
       <c:scatterChart>
         <c:scatterStyle val="lineMarker"/>
         <c:varyColors val="0"/>
@@ -1414,12 +1424,12 @@
   </cdr:relSizeAnchor>
   <cdr:relSizeAnchor xmlns:cdr="http://schemas.openxmlformats.org/drawingml/2006/chartDrawing">
     <cdr:from>
-      <cdr:x>0.08375</cdr:x>
-      <cdr:y>0.3432</cdr:y>
+      <cdr:x>0.08043</cdr:x>
+      <cdr:y>0.37242</cdr:y>
     </cdr:from>
     <cdr:to>
-      <cdr:x>0.08375</cdr:x>
-      <cdr:y>0.61953</cdr:y>
+      <cdr:x>0.08043</cdr:x>
+      <cdr:y>0.59742</cdr:y>
     </cdr:to>
     <cdr:cxnSp macro="">
       <cdr:nvCxnSpPr>
@@ -1434,8 +1444,8 @@
       </cdr:nvCxnSpPr>
       <cdr:spPr>
         <a:xfrm xmlns:a="http://schemas.openxmlformats.org/drawingml/2006/main" flipV="1">
-          <a:off x="680720" y="1859706"/>
-          <a:ext cx="0" cy="1497328"/>
+          <a:off x="653704" y="2018037"/>
+          <a:ext cx="0" cy="1219193"/>
         </a:xfrm>
         <a:prstGeom xmlns:a="http://schemas.openxmlformats.org/drawingml/2006/main" prst="straightConnector1">
           <a:avLst/>
@@ -1646,6 +1656,54 @@
       </cdr:style>
     </cdr:cxnSp>
   </cdr:relSizeAnchor>
+  <cdr:relSizeAnchor xmlns:cdr="http://schemas.openxmlformats.org/drawingml/2006/chartDrawing">
+    <cdr:from>
+      <cdr:x>0.08043</cdr:x>
+      <cdr:y>0.28399</cdr:y>
+    </cdr:from>
+    <cdr:to>
+      <cdr:x>0.08043</cdr:x>
+      <cdr:y>0.33351</cdr:y>
+    </cdr:to>
+    <cdr:cxnSp macro="">
+      <cdr:nvCxnSpPr>
+        <cdr:cNvPr id="8" name="Straight Arrow Connector 7">
+          <a:extLst xmlns:a="http://schemas.openxmlformats.org/drawingml/2006/main">
+            <a:ext uri="{FF2B5EF4-FFF2-40B4-BE49-F238E27FC236}">
+              <a16:creationId xmlns:a16="http://schemas.microsoft.com/office/drawing/2014/main" id="{33CA096F-7E5F-4A82-9F2D-A89E6DC334D1}"/>
+            </a:ext>
+          </a:extLst>
+        </cdr:cNvPr>
+        <cdr:cNvCxnSpPr/>
+      </cdr:nvCxnSpPr>
+      <cdr:spPr>
+        <a:xfrm xmlns:a="http://schemas.openxmlformats.org/drawingml/2006/main" flipV="1">
+          <a:off x="653704" y="1538829"/>
+          <a:ext cx="0" cy="268370"/>
+        </a:xfrm>
+        <a:prstGeom xmlns:a="http://schemas.openxmlformats.org/drawingml/2006/main" prst="straightConnector1">
+          <a:avLst/>
+        </a:prstGeom>
+        <a:ln xmlns:a="http://schemas.openxmlformats.org/drawingml/2006/main">
+          <a:tailEnd type="triangle"/>
+        </a:ln>
+      </cdr:spPr>
+      <cdr:style>
+        <a:lnRef xmlns:a="http://schemas.openxmlformats.org/drawingml/2006/main" idx="1">
+          <a:schemeClr val="accent1"/>
+        </a:lnRef>
+        <a:fillRef xmlns:a="http://schemas.openxmlformats.org/drawingml/2006/main" idx="0">
+          <a:schemeClr val="accent1"/>
+        </a:fillRef>
+        <a:effectRef xmlns:a="http://schemas.openxmlformats.org/drawingml/2006/main" idx="0">
+          <a:schemeClr val="accent1"/>
+        </a:effectRef>
+        <a:fontRef xmlns:a="http://schemas.openxmlformats.org/drawingml/2006/main" idx="minor">
+          <a:schemeClr val="tx1"/>
+        </a:fontRef>
+      </cdr:style>
+    </cdr:cxnSp>
+  </cdr:relSizeAnchor>
 </c:userShapes>
 </file>
 
@@ -1798,7 +1856,7 @@
           <a:p>
             <a:fld id="{F11C8E6A-C2C3-42B2-9B6F-19EFF277C5DD}" type="datetimeFigureOut">
               <a:rPr lang="he-IL" smtClean="0"/>
-              <a:t>י"ב/כסלו/תשפ"א</a:t>
+              <a:t>י"ז/כסלו/תשפ"א</a:t>
             </a:fld>
             <a:endParaRPr lang="he-IL"/>
           </a:p>
@@ -1998,7 +2056,7 @@
           <a:p>
             <a:fld id="{F11C8E6A-C2C3-42B2-9B6F-19EFF277C5DD}" type="datetimeFigureOut">
               <a:rPr lang="he-IL" smtClean="0"/>
-              <a:t>י"ב/כסלו/תשפ"א</a:t>
+              <a:t>י"ז/כסלו/תשפ"א</a:t>
             </a:fld>
             <a:endParaRPr lang="he-IL"/>
           </a:p>
@@ -2208,7 +2266,7 @@
           <a:p>
             <a:fld id="{F11C8E6A-C2C3-42B2-9B6F-19EFF277C5DD}" type="datetimeFigureOut">
               <a:rPr lang="he-IL" smtClean="0"/>
-              <a:t>י"ב/כסלו/תשפ"א</a:t>
+              <a:t>י"ז/כסלו/תשפ"א</a:t>
             </a:fld>
             <a:endParaRPr lang="he-IL"/>
           </a:p>
@@ -2408,7 +2466,7 @@
           <a:p>
             <a:fld id="{F11C8E6A-C2C3-42B2-9B6F-19EFF277C5DD}" type="datetimeFigureOut">
               <a:rPr lang="he-IL" smtClean="0"/>
-              <a:t>י"ב/כסלו/תשפ"א</a:t>
+              <a:t>י"ז/כסלו/תשפ"א</a:t>
             </a:fld>
             <a:endParaRPr lang="he-IL"/>
           </a:p>
@@ -2684,7 +2742,7 @@
           <a:p>
             <a:fld id="{F11C8E6A-C2C3-42B2-9B6F-19EFF277C5DD}" type="datetimeFigureOut">
               <a:rPr lang="he-IL" smtClean="0"/>
-              <a:t>י"ב/כסלו/תשפ"א</a:t>
+              <a:t>י"ז/כסלו/תשפ"א</a:t>
             </a:fld>
             <a:endParaRPr lang="he-IL"/>
           </a:p>
@@ -2952,7 +3010,7 @@
           <a:p>
             <a:fld id="{F11C8E6A-C2C3-42B2-9B6F-19EFF277C5DD}" type="datetimeFigureOut">
               <a:rPr lang="he-IL" smtClean="0"/>
-              <a:t>י"ב/כסלו/תשפ"א</a:t>
+              <a:t>י"ז/כסלו/תשפ"א</a:t>
             </a:fld>
             <a:endParaRPr lang="he-IL"/>
           </a:p>
@@ -3367,7 +3425,7 @@
           <a:p>
             <a:fld id="{F11C8E6A-C2C3-42B2-9B6F-19EFF277C5DD}" type="datetimeFigureOut">
               <a:rPr lang="he-IL" smtClean="0"/>
-              <a:t>י"ב/כסלו/תשפ"א</a:t>
+              <a:t>י"ז/כסלו/תשפ"א</a:t>
             </a:fld>
             <a:endParaRPr lang="he-IL"/>
           </a:p>
@@ -3509,7 +3567,7 @@
           <a:p>
             <a:fld id="{F11C8E6A-C2C3-42B2-9B6F-19EFF277C5DD}" type="datetimeFigureOut">
               <a:rPr lang="he-IL" smtClean="0"/>
-              <a:t>י"ב/כסלו/תשפ"א</a:t>
+              <a:t>י"ז/כסלו/תשפ"א</a:t>
             </a:fld>
             <a:endParaRPr lang="he-IL"/>
           </a:p>
@@ -3622,7 +3680,7 @@
           <a:p>
             <a:fld id="{F11C8E6A-C2C3-42B2-9B6F-19EFF277C5DD}" type="datetimeFigureOut">
               <a:rPr lang="he-IL" smtClean="0"/>
-              <a:t>י"ב/כסלו/תשפ"א</a:t>
+              <a:t>י"ז/כסלו/תשפ"א</a:t>
             </a:fld>
             <a:endParaRPr lang="he-IL"/>
           </a:p>
@@ -3935,7 +3993,7 @@
           <a:p>
             <a:fld id="{F11C8E6A-C2C3-42B2-9B6F-19EFF277C5DD}" type="datetimeFigureOut">
               <a:rPr lang="he-IL" smtClean="0"/>
-              <a:t>י"ב/כסלו/תשפ"א</a:t>
+              <a:t>י"ז/כסלו/תשפ"א</a:t>
             </a:fld>
             <a:endParaRPr lang="he-IL"/>
           </a:p>
@@ -4224,7 +4282,7 @@
           <a:p>
             <a:fld id="{F11C8E6A-C2C3-42B2-9B6F-19EFF277C5DD}" type="datetimeFigureOut">
               <a:rPr lang="he-IL" smtClean="0"/>
-              <a:t>י"ב/כסלו/תשפ"א</a:t>
+              <a:t>י"ז/כסלו/תשפ"א</a:t>
             </a:fld>
             <a:endParaRPr lang="he-IL"/>
           </a:p>
@@ -4467,7 +4525,7 @@
           <a:p>
             <a:fld id="{F11C8E6A-C2C3-42B2-9B6F-19EFF277C5DD}" type="datetimeFigureOut">
               <a:rPr lang="he-IL" smtClean="0"/>
-              <a:t>י"ב/כסלו/תשפ"א</a:t>
+              <a:t>י"ז/כסלו/תשפ"א</a:t>
             </a:fld>
             <a:endParaRPr lang="he-IL"/>
           </a:p>
@@ -4897,7 +4955,7 @@
           <p:nvPr>
             <p:extLst>
               <p:ext uri="{D42A27DB-BD31-4B8C-83A1-F6EECF244321}">
-                <p14:modId xmlns:p14="http://schemas.microsoft.com/office/powerpoint/2010/main" val="2323072631"/>
+                <p14:modId xmlns:p14="http://schemas.microsoft.com/office/powerpoint/2010/main" val="488451248"/>
               </p:ext>
             </p:extLst>
           </p:nvPr>
@@ -5397,39 +5455,244 @@
           </a:fontRef>
         </p:style>
       </p:cxnSp>
+      <p:sp>
+        <p:nvSpPr>
+          <p:cNvPr id="49" name="TextBox 48">
+            <a:extLst>
+              <a:ext uri="{FF2B5EF4-FFF2-40B4-BE49-F238E27FC236}">
+                <a16:creationId xmlns:a16="http://schemas.microsoft.com/office/drawing/2014/main" id="{2929ECDD-2894-4540-AC59-CFA97211AE80}"/>
+              </a:ext>
+            </a:extLst>
+          </p:cNvPr>
+          <p:cNvSpPr txBox="1"/>
+          <p:nvPr/>
+        </p:nvSpPr>
+        <p:spPr>
+          <a:xfrm>
+            <a:off x="4510118" y="2345323"/>
+            <a:ext cx="2556164" cy="338554"/>
+          </a:xfrm>
+          <a:prstGeom prst="rect">
+            <a:avLst/>
+          </a:prstGeom>
+          <a:noFill/>
+        </p:spPr>
+        <p:txBody>
+          <a:bodyPr wrap="square" rtlCol="1">
+            <a:spAutoFit/>
+          </a:bodyPr>
+          <a:lstStyle/>
+          <a:p>
+            <a:r>
+              <a:rPr lang="en-US" sz="1600" dirty="0">
+                <a:solidFill>
+                  <a:schemeClr val="accent1"/>
+                </a:solidFill>
+              </a:rPr>
+              <a:t>A-&gt;D-&gt;B-&gt;C-&gt;L : 8.7</a:t>
+            </a:r>
+            <a:endParaRPr lang="he-IL" dirty="0">
+              <a:solidFill>
+                <a:schemeClr val="accent1"/>
+              </a:solidFill>
+            </a:endParaRPr>
+          </a:p>
+        </p:txBody>
+      </p:sp>
+      <p:sp>
+        <p:nvSpPr>
+          <p:cNvPr id="50" name="TextBox 49">
+            <a:extLst>
+              <a:ext uri="{FF2B5EF4-FFF2-40B4-BE49-F238E27FC236}">
+                <a16:creationId xmlns:a16="http://schemas.microsoft.com/office/drawing/2014/main" id="{1C37F9B8-8A48-4040-B217-F0EE45240FC7}"/>
+              </a:ext>
+            </a:extLst>
+          </p:cNvPr>
+          <p:cNvSpPr txBox="1"/>
+          <p:nvPr/>
+        </p:nvSpPr>
+        <p:spPr>
+          <a:xfrm>
+            <a:off x="4510118" y="2801749"/>
+            <a:ext cx="2556164" cy="338554"/>
+          </a:xfrm>
+          <a:prstGeom prst="rect">
+            <a:avLst/>
+          </a:prstGeom>
+          <a:noFill/>
+        </p:spPr>
+        <p:txBody>
+          <a:bodyPr wrap="square" rtlCol="1">
+            <a:spAutoFit/>
+          </a:bodyPr>
+          <a:lstStyle/>
+          <a:p>
+            <a:r>
+              <a:rPr lang="en-US" sz="1600" dirty="0">
+                <a:solidFill>
+                  <a:schemeClr val="accent6"/>
+                </a:solidFill>
+              </a:rPr>
+              <a:t>A-&gt;B + B-&gt;C+ C-&gt;D : 9</a:t>
+            </a:r>
+            <a:endParaRPr lang="he-IL" dirty="0">
+              <a:solidFill>
+                <a:schemeClr val="accent6"/>
+              </a:solidFill>
+            </a:endParaRPr>
+          </a:p>
+        </p:txBody>
+      </p:sp>
+      <p:grpSp>
+        <p:nvGrpSpPr>
+          <p:cNvPr id="21" name="Group 20">
+            <a:extLst>
+              <a:ext uri="{FF2B5EF4-FFF2-40B4-BE49-F238E27FC236}">
+                <a16:creationId xmlns:a16="http://schemas.microsoft.com/office/drawing/2014/main" id="{86CB002B-864F-4637-B4C6-D28863E3960C}"/>
+              </a:ext>
+            </a:extLst>
+          </p:cNvPr>
+          <p:cNvGrpSpPr/>
+          <p:nvPr/>
+        </p:nvGrpSpPr>
+        <p:grpSpPr>
+          <a:xfrm>
+            <a:off x="2253615" y="2127487"/>
+            <a:ext cx="449580" cy="373380"/>
+            <a:chOff x="2263140" y="2392680"/>
+            <a:chExt cx="1854518" cy="883920"/>
+          </a:xfrm>
+        </p:grpSpPr>
+        <p:sp>
+          <p:nvSpPr>
+            <p:cNvPr id="22" name="Oval 21">
+              <a:extLst>
+                <a:ext uri="{FF2B5EF4-FFF2-40B4-BE49-F238E27FC236}">
+                  <a16:creationId xmlns:a16="http://schemas.microsoft.com/office/drawing/2014/main" id="{7B54AEFA-BFBB-4D97-9624-EADB42394198}"/>
+                </a:ext>
+              </a:extLst>
+            </p:cNvPr>
+            <p:cNvSpPr/>
+            <p:nvPr/>
+          </p:nvSpPr>
+          <p:spPr>
+            <a:xfrm>
+              <a:off x="2263140" y="2392680"/>
+              <a:ext cx="1508760" cy="883920"/>
+            </a:xfrm>
+            <a:prstGeom prst="ellipse">
+              <a:avLst/>
+            </a:prstGeom>
+          </p:spPr>
+          <p:style>
+            <a:lnRef idx="2">
+              <a:schemeClr val="accent1">
+                <a:shade val="50000"/>
+              </a:schemeClr>
+            </a:lnRef>
+            <a:fillRef idx="1">
+              <a:schemeClr val="accent1"/>
+            </a:fillRef>
+            <a:effectRef idx="0">
+              <a:schemeClr val="accent1"/>
+            </a:effectRef>
+            <a:fontRef idx="minor">
+              <a:schemeClr val="lt1"/>
+            </a:fontRef>
+          </p:style>
+          <p:txBody>
+            <a:bodyPr rtlCol="1" anchor="ctr"/>
+            <a:lstStyle/>
+            <a:p>
+              <a:pPr algn="ctr"/>
+              <a:endParaRPr lang="he-IL" dirty="0"/>
+            </a:p>
+          </p:txBody>
+        </p:sp>
+        <p:sp>
+          <p:nvSpPr>
+            <p:cNvPr id="23" name="TextBox 22">
+              <a:extLst>
+                <a:ext uri="{FF2B5EF4-FFF2-40B4-BE49-F238E27FC236}">
+                  <a16:creationId xmlns:a16="http://schemas.microsoft.com/office/drawing/2014/main" id="{DDFBB819-16EF-4F1F-A958-FFA5CF787CA5}"/>
+                </a:ext>
+              </a:extLst>
+            </p:cNvPr>
+            <p:cNvSpPr txBox="1"/>
+            <p:nvPr/>
+          </p:nvSpPr>
+          <p:spPr>
+            <a:xfrm>
+              <a:off x="2374581" y="2402263"/>
+              <a:ext cx="1743077" cy="874337"/>
+            </a:xfrm>
+            <a:prstGeom prst="rect">
+              <a:avLst/>
+            </a:prstGeom>
+            <a:noFill/>
+          </p:spPr>
+          <p:txBody>
+            <a:bodyPr wrap="square" rtlCol="1">
+              <a:spAutoFit/>
+            </a:bodyPr>
+            <a:lstStyle/>
+            <a:p>
+              <a:r>
+                <a:rPr lang="en-US" dirty="0">
+                  <a:solidFill>
+                    <a:schemeClr val="bg1"/>
+                  </a:solidFill>
+                </a:rPr>
+                <a:t>L</a:t>
+              </a:r>
+              <a:endParaRPr lang="he-IL" dirty="0">
+                <a:solidFill>
+                  <a:schemeClr val="bg1"/>
+                </a:solidFill>
+              </a:endParaRPr>
+            </a:p>
+          </p:txBody>
+        </p:sp>
+      </p:grpSp>
       <p:cxnSp>
         <p:nvCxnSpPr>
-          <p:cNvPr id="18" name="Straight Arrow Connector 17">
-            <a:extLst>
-              <a:ext uri="{FF2B5EF4-FFF2-40B4-BE49-F238E27FC236}">
-                <a16:creationId xmlns:a16="http://schemas.microsoft.com/office/drawing/2014/main" id="{1D9482C0-9C47-48AF-87EA-A55C058A0D68}"/>
-              </a:ext>
-            </a:extLst>
-          </p:cNvPr>
-          <p:cNvCxnSpPr/>
+          <p:cNvPr id="3" name="Straight Arrow Connector 2">
+            <a:extLst>
+              <a:ext uri="{FF2B5EF4-FFF2-40B4-BE49-F238E27FC236}">
+                <a16:creationId xmlns:a16="http://schemas.microsoft.com/office/drawing/2014/main" id="{5337130F-3CE5-4D58-8F8D-AAB8F6DEA543}"/>
+              </a:ext>
+            </a:extLst>
+          </p:cNvPr>
+          <p:cNvCxnSpPr>
+            <a:cxnSpLocks/>
+          </p:cNvCxnSpPr>
           <p:nvPr/>
         </p:nvCxnSpPr>
         <p:spPr>
-          <a:xfrm flipV="1">
-            <a:off x="2501438" y="4450080"/>
-            <a:ext cx="0" cy="937260"/>
+          <a:xfrm>
+            <a:off x="2685704" y="2619586"/>
+            <a:ext cx="3410296" cy="2905574"/>
           </a:xfrm>
           <a:prstGeom prst="straightConnector1">
             <a:avLst/>
           </a:prstGeom>
           <a:ln>
+            <a:solidFill>
+              <a:schemeClr val="accent6"/>
+            </a:solidFill>
+            <a:headEnd type="triangle"/>
             <a:tailEnd type="triangle"/>
           </a:ln>
         </p:spPr>
         <p:style>
           <a:lnRef idx="1">
-            <a:schemeClr val="accent6"/>
+            <a:schemeClr val="accent1"/>
           </a:lnRef>
           <a:fillRef idx="0">
-            <a:schemeClr val="accent6"/>
+            <a:schemeClr val="accent1"/>
           </a:fillRef>
           <a:effectRef idx="0">
-            <a:schemeClr val="accent6"/>
+            <a:schemeClr val="accent1"/>
           </a:effectRef>
           <a:fontRef idx="minor">
             <a:schemeClr val="tx1"/>
@@ -5438,10 +5701,10 @@
       </p:cxnSp>
       <p:cxnSp>
         <p:nvCxnSpPr>
-          <p:cNvPr id="45" name="Straight Arrow Connector 44">
-            <a:extLst>
-              <a:ext uri="{FF2B5EF4-FFF2-40B4-BE49-F238E27FC236}">
-                <a16:creationId xmlns:a16="http://schemas.microsoft.com/office/drawing/2014/main" id="{627F981D-879E-412B-A313-5A179846DE78}"/>
+          <p:cNvPr id="28" name="Straight Arrow Connector 27">
+            <a:extLst>
+              <a:ext uri="{FF2B5EF4-FFF2-40B4-BE49-F238E27FC236}">
+                <a16:creationId xmlns:a16="http://schemas.microsoft.com/office/drawing/2014/main" id="{ECB3F7CC-90D7-4854-8141-93CDB180A8A0}"/>
               </a:ext>
             </a:extLst>
           </p:cNvPr>
@@ -5451,26 +5714,30 @@
           <p:nvPr/>
         </p:nvCxnSpPr>
         <p:spPr>
-          <a:xfrm flipV="1">
-            <a:off x="2501438" y="2857500"/>
-            <a:ext cx="0" cy="937260"/>
+          <a:xfrm>
+            <a:off x="2441866" y="2831133"/>
+            <a:ext cx="4154" cy="1005959"/>
           </a:xfrm>
           <a:prstGeom prst="straightConnector1">
             <a:avLst/>
           </a:prstGeom>
           <a:ln>
+            <a:solidFill>
+              <a:schemeClr val="accent6"/>
+            </a:solidFill>
+            <a:headEnd type="triangle"/>
             <a:tailEnd type="triangle"/>
           </a:ln>
         </p:spPr>
         <p:style>
           <a:lnRef idx="1">
-            <a:schemeClr val="accent6"/>
+            <a:schemeClr val="accent1"/>
           </a:lnRef>
           <a:fillRef idx="0">
-            <a:schemeClr val="accent6"/>
+            <a:schemeClr val="accent1"/>
           </a:fillRef>
           <a:effectRef idx="0">
-            <a:schemeClr val="accent6"/>
+            <a:schemeClr val="accent1"/>
           </a:effectRef>
           <a:fontRef idx="minor">
             <a:schemeClr val="tx1"/>
@@ -5479,10 +5746,10 @@
       </p:cxnSp>
       <p:cxnSp>
         <p:nvCxnSpPr>
-          <p:cNvPr id="48" name="Straight Arrow Connector 47">
-            <a:extLst>
-              <a:ext uri="{FF2B5EF4-FFF2-40B4-BE49-F238E27FC236}">
-                <a16:creationId xmlns:a16="http://schemas.microsoft.com/office/drawing/2014/main" id="{534E5064-D75E-494F-8230-2CB523011246}"/>
+          <p:cNvPr id="41" name="Straight Arrow Connector 40">
+            <a:extLst>
+              <a:ext uri="{FF2B5EF4-FFF2-40B4-BE49-F238E27FC236}">
+                <a16:creationId xmlns:a16="http://schemas.microsoft.com/office/drawing/2014/main" id="{CEE6CC8C-EF3B-4302-927D-765699276A2A}"/>
               </a:ext>
             </a:extLst>
           </p:cNvPr>
@@ -5493,119 +5760,35 @@
         </p:nvCxnSpPr>
         <p:spPr>
           <a:xfrm>
-            <a:off x="2712720" y="2514600"/>
-            <a:ext cx="3354880" cy="2948940"/>
+            <a:off x="2441866" y="4424738"/>
+            <a:ext cx="4154" cy="1005959"/>
           </a:xfrm>
           <a:prstGeom prst="straightConnector1">
             <a:avLst/>
           </a:prstGeom>
           <a:ln>
+            <a:solidFill>
+              <a:schemeClr val="accent6"/>
+            </a:solidFill>
+            <a:headEnd type="triangle"/>
             <a:tailEnd type="triangle"/>
           </a:ln>
         </p:spPr>
         <p:style>
           <a:lnRef idx="1">
-            <a:schemeClr val="accent6"/>
+            <a:schemeClr val="accent1"/>
           </a:lnRef>
           <a:fillRef idx="0">
-            <a:schemeClr val="accent6"/>
+            <a:schemeClr val="accent1"/>
           </a:fillRef>
           <a:effectRef idx="0">
-            <a:schemeClr val="accent6"/>
+            <a:schemeClr val="accent1"/>
           </a:effectRef>
           <a:fontRef idx="minor">
             <a:schemeClr val="tx1"/>
           </a:fontRef>
         </p:style>
       </p:cxnSp>
-      <p:sp>
-        <p:nvSpPr>
-          <p:cNvPr id="49" name="TextBox 48">
-            <a:extLst>
-              <a:ext uri="{FF2B5EF4-FFF2-40B4-BE49-F238E27FC236}">
-                <a16:creationId xmlns:a16="http://schemas.microsoft.com/office/drawing/2014/main" id="{2929ECDD-2894-4540-AC59-CFA97211AE80}"/>
-              </a:ext>
-            </a:extLst>
-          </p:cNvPr>
-          <p:cNvSpPr txBox="1"/>
-          <p:nvPr/>
-        </p:nvSpPr>
-        <p:spPr>
-          <a:xfrm>
-            <a:off x="4789518" y="2345323"/>
-            <a:ext cx="2556164" cy="338554"/>
-          </a:xfrm>
-          <a:prstGeom prst="rect">
-            <a:avLst/>
-          </a:prstGeom>
-          <a:noFill/>
-        </p:spPr>
-        <p:txBody>
-          <a:bodyPr wrap="square" rtlCol="1">
-            <a:spAutoFit/>
-          </a:bodyPr>
-          <a:lstStyle/>
-          <a:p>
-            <a:r>
-              <a:rPr lang="en-US" sz="1600" dirty="0">
-                <a:solidFill>
-                  <a:schemeClr val="accent1"/>
-                </a:solidFill>
-              </a:rPr>
-              <a:t>A-&gt;D-&gt;B-&gt;C : 8.6</a:t>
-            </a:r>
-            <a:endParaRPr lang="he-IL" dirty="0">
-              <a:solidFill>
-                <a:schemeClr val="accent1"/>
-              </a:solidFill>
-            </a:endParaRPr>
-          </a:p>
-        </p:txBody>
-      </p:sp>
-      <p:sp>
-        <p:nvSpPr>
-          <p:cNvPr id="50" name="TextBox 49">
-            <a:extLst>
-              <a:ext uri="{FF2B5EF4-FFF2-40B4-BE49-F238E27FC236}">
-                <a16:creationId xmlns:a16="http://schemas.microsoft.com/office/drawing/2014/main" id="{1C37F9B8-8A48-4040-B217-F0EE45240FC7}"/>
-              </a:ext>
-            </a:extLst>
-          </p:cNvPr>
-          <p:cNvSpPr txBox="1"/>
-          <p:nvPr/>
-        </p:nvSpPr>
-        <p:spPr>
-          <a:xfrm>
-            <a:off x="4789518" y="2804639"/>
-            <a:ext cx="2556164" cy="338554"/>
-          </a:xfrm>
-          <a:prstGeom prst="rect">
-            <a:avLst/>
-          </a:prstGeom>
-          <a:noFill/>
-        </p:spPr>
-        <p:txBody>
-          <a:bodyPr wrap="square" rtlCol="1">
-            <a:spAutoFit/>
-          </a:bodyPr>
-          <a:lstStyle/>
-          <a:p>
-            <a:r>
-              <a:rPr lang="en-US" sz="1600" dirty="0">
-                <a:solidFill>
-                  <a:schemeClr val="accent6"/>
-                </a:solidFill>
-              </a:rPr>
-              <a:t>A-&gt;B-&gt;C-&gt;D : 9</a:t>
-            </a:r>
-            <a:endParaRPr lang="he-IL" dirty="0">
-              <a:solidFill>
-                <a:schemeClr val="accent6"/>
-              </a:solidFill>
-            </a:endParaRPr>
-          </a:p>
-        </p:txBody>
-      </p:sp>
     </p:spTree>
     <p:extLst>
       <p:ext uri="{BB962C8B-B14F-4D97-AF65-F5344CB8AC3E}">
@@ -5915,21 +6098,6 @@
 </file>
 
 <file path=customXml/item1.xml><?xml version="1.0" encoding="utf-8"?>
-<p:properties xmlns:p="http://schemas.microsoft.com/office/2006/metadata/properties" xmlns:xsi="http://www.w3.org/2001/XMLSchema-instance" xmlns:pc="http://schemas.microsoft.com/office/infopath/2007/PartnerControls">
-  <documentManagement/>
-</p:properties>
-</file>
-
-<file path=customXml/item2.xml><?xml version="1.0" encoding="utf-8"?>
-<?mso-contentType ?>
-<FormTemplates xmlns="http://schemas.microsoft.com/sharepoint/v3/contenttype/forms">
-  <Display>DocumentLibraryForm</Display>
-  <Edit>DocumentLibraryForm</Edit>
-  <New>DocumentLibraryForm</New>
-</FormTemplates>
-</file>
-
-<file path=customXml/item3.xml><?xml version="1.0" encoding="utf-8"?>
 <ct:contentTypeSchema xmlns:ct="http://schemas.microsoft.com/office/2006/metadata/contentType" xmlns:ma="http://schemas.microsoft.com/office/2006/metadata/properties/metaAttributes" ct:_="" ma:_="" ma:contentTypeName="Document" ma:contentTypeID="0x0101003012355D375B7040A25B0E2ED4505B42" ma:contentTypeVersion="6" ma:contentTypeDescription="Create a new document." ma:contentTypeScope="" ma:versionID="3dd2504b8d6553ae6c01d7778126904b">
   <xsd:schema xmlns:xsd="http://www.w3.org/2001/XMLSchema" xmlns:xs="http://www.w3.org/2001/XMLSchema" xmlns:p="http://schemas.microsoft.com/office/2006/metadata/properties" xmlns:ns3="72f75162-65f5-4d31-87b0-90b66f5c5264" targetNamespace="http://schemas.microsoft.com/office/2006/metadata/properties" ma:root="true" ma:fieldsID="34bb381a9e733b3bfd9718a514822784" ns3:_="">
     <xsd:import namespace="72f75162-65f5-4d31-87b0-90b66f5c5264"/>
@@ -6087,24 +6255,22 @@
 </ct:contentTypeSchema>
 </file>
 
-<file path=customXml/itemProps1.xml><?xml version="1.0" encoding="utf-8"?>
-<ds:datastoreItem xmlns:ds="http://schemas.openxmlformats.org/officeDocument/2006/customXml" ds:itemID="{1BFB3520-4466-4CF8-BF29-8298D04C1584}">
-  <ds:schemaRefs>
-    <ds:schemaRef ds:uri="http://schemas.microsoft.com/office/2006/metadata/properties"/>
-    <ds:schemaRef ds:uri="http://schemas.microsoft.com/office/infopath/2007/PartnerControls"/>
-  </ds:schemaRefs>
-</ds:datastoreItem>
+<file path=customXml/item2.xml><?xml version="1.0" encoding="utf-8"?>
+<?mso-contentType ?>
+<FormTemplates xmlns="http://schemas.microsoft.com/sharepoint/v3/contenttype/forms">
+  <Display>DocumentLibraryForm</Display>
+  <Edit>DocumentLibraryForm</Edit>
+  <New>DocumentLibraryForm</New>
+</FormTemplates>
 </file>
 
-<file path=customXml/itemProps2.xml><?xml version="1.0" encoding="utf-8"?>
-<ds:datastoreItem xmlns:ds="http://schemas.openxmlformats.org/officeDocument/2006/customXml" ds:itemID="{B01FBFE9-53C6-4CA9-848F-C081ECD5D22E}">
-  <ds:schemaRefs>
-    <ds:schemaRef ds:uri="http://schemas.microsoft.com/sharepoint/v3/contenttype/forms"/>
-  </ds:schemaRefs>
-</ds:datastoreItem>
+<file path=customXml/item3.xml><?xml version="1.0" encoding="utf-8"?>
+<p:properties xmlns:p="http://schemas.microsoft.com/office/2006/metadata/properties" xmlns:xsi="http://www.w3.org/2001/XMLSchema-instance" xmlns:pc="http://schemas.microsoft.com/office/infopath/2007/PartnerControls">
+  <documentManagement/>
+</p:properties>
 </file>
 
-<file path=customXml/itemProps3.xml><?xml version="1.0" encoding="utf-8"?>
+<file path=customXml/itemProps1.xml><?xml version="1.0" encoding="utf-8"?>
 <ds:datastoreItem xmlns:ds="http://schemas.openxmlformats.org/officeDocument/2006/customXml" ds:itemID="{426C6010-0F3B-4F81-9846-C8412AEB9DEA}">
   <ds:schemaRefs>
     <ds:schemaRef ds:uri="http://schemas.microsoft.com/office/2006/metadata/contentType"/>
@@ -6120,4 +6286,21 @@
     <ds:schemaRef ds:uri="http://schemas.microsoft.com/internal/obd"/>
   </ds:schemaRefs>
 </ds:datastoreItem>
+</file>
+
+<file path=customXml/itemProps2.xml><?xml version="1.0" encoding="utf-8"?>
+<ds:datastoreItem xmlns:ds="http://schemas.openxmlformats.org/officeDocument/2006/customXml" ds:itemID="{B01FBFE9-53C6-4CA9-848F-C081ECD5D22E}">
+  <ds:schemaRefs>
+    <ds:schemaRef ds:uri="http://schemas.microsoft.com/sharepoint/v3/contenttype/forms"/>
+  </ds:schemaRefs>
+</ds:datastoreItem>
+</file>
+
+<file path=customXml/itemProps3.xml><?xml version="1.0" encoding="utf-8"?>
+<ds:datastoreItem xmlns:ds="http://schemas.openxmlformats.org/officeDocument/2006/customXml" ds:itemID="{1BFB3520-4466-4CF8-BF29-8298D04C1584}">
+  <ds:schemaRefs>
+    <ds:schemaRef ds:uri="http://schemas.microsoft.com/office/2006/metadata/properties"/>
+    <ds:schemaRef ds:uri="http://schemas.microsoft.com/office/infopath/2007/PartnerControls"/>
+  </ds:schemaRefs>
+</ds:datastoreItem>
 </file>
</xml_diff>